<commit_message>
Updated the title slide to add classes
</commit_message>
<xml_diff>
--- a/FA24/WK4/CodingSessionFour.pptx
+++ b/FA24/WK4/CodingSessionFour.pptx
@@ -16698,7 +16698,19 @@
                 <a:cs typeface="Calibri"/>
                 <a:sym typeface="Calibri"/>
               </a:rPr>
-              <a:t>FinTech @ IU Python Session #4 – Libraries &amp; Algorithms</a:t>
+              <a:t>FinTech @ IU Python Session #4 – </a:t>
+            </a:r>
+            <a:r>
+              <a:rPr lang="en-US" sz="3200" b="1" dirty="0">
+                <a:solidFill>
+                  <a:schemeClr val="lt1"/>
+                </a:solidFill>
+                <a:latin typeface="Calibri"/>
+                <a:ea typeface="Calibri"/>
+                <a:cs typeface="Calibri"/>
+                <a:sym typeface="Calibri"/>
+              </a:rPr>
+              <a:t>Algos, Classes, and Libraries</a:t>
             </a:r>
             <a:endParaRPr sz="3200" b="0" i="0" u="none" strike="noStrike" cap="none" dirty="0">
               <a:solidFill>
@@ -19225,7 +19237,7 @@
                   <a:schemeClr val="bg1"/>
                 </a:solidFill>
               </a:rPr>
-              <a:t>Algorithmic Complexities</a:t>
+              <a:t>Algorithmic Complexity</a:t>
             </a:r>
           </a:p>
         </p:txBody>
@@ -19833,7 +19845,7 @@
                   <a:schemeClr val="bg1"/>
                 </a:solidFill>
               </a:rPr>
-              <a:t>Algorithmic Complexities Cont.</a:t>
+              <a:t>Algorithmic Complexity Cont.</a:t>
             </a:r>
           </a:p>
         </p:txBody>

</xml_diff>